<commit_message>
Special-purpose collections: Unmodifiable: - updated numbers - updated figure
</commit_message>
<xml_diff>
--- a/part1/Figures/collections/product-unmodifiable-arraylist.pptx
+++ b/part1/Figures/collections/product-unmodifiable-arraylist.pptx
@@ -328,7 +328,7 @@
               <a:pPr>
                 <a:defRPr/>
               </a:pPr>
-              <a:t>4/7/13</a:t>
+              <a:t>4/16/13</a:t>
             </a:fld>
             <a:endParaRPr lang="en-US"/>
           </a:p>
@@ -520,7 +520,7 @@
               <a:pPr>
                 <a:defRPr/>
               </a:pPr>
-              <a:t>4/7/13</a:t>
+              <a:t>4/16/13</a:t>
             </a:fld>
             <a:endParaRPr lang="en-US"/>
           </a:p>
@@ -722,7 +722,7 @@
               <a:pPr>
                 <a:defRPr/>
               </a:pPr>
-              <a:t>4/7/13</a:t>
+              <a:t>4/16/13</a:t>
             </a:fld>
             <a:endParaRPr lang="en-US"/>
           </a:p>
@@ -914,7 +914,7 @@
               <a:pPr>
                 <a:defRPr/>
               </a:pPr>
-              <a:t>4/7/13</a:t>
+              <a:t>4/16/13</a:t>
             </a:fld>
             <a:endParaRPr lang="en-US"/>
           </a:p>
@@ -1182,7 +1182,7 @@
               <a:pPr>
                 <a:defRPr/>
               </a:pPr>
-              <a:t>4/7/13</a:t>
+              <a:t>4/16/13</a:t>
             </a:fld>
             <a:endParaRPr lang="en-US"/>
           </a:p>
@@ -1492,7 +1492,7 @@
               <a:pPr>
                 <a:defRPr/>
               </a:pPr>
-              <a:t>4/7/13</a:t>
+              <a:t>4/16/13</a:t>
             </a:fld>
             <a:endParaRPr lang="en-US"/>
           </a:p>
@@ -1936,7 +1936,7 @@
               <a:pPr>
                 <a:defRPr/>
               </a:pPr>
-              <a:t>4/7/13</a:t>
+              <a:t>4/16/13</a:t>
             </a:fld>
             <a:endParaRPr lang="en-US"/>
           </a:p>
@@ -2076,7 +2076,7 @@
               <a:pPr>
                 <a:defRPr/>
               </a:pPr>
-              <a:t>4/7/13</a:t>
+              <a:t>4/16/13</a:t>
             </a:fld>
             <a:endParaRPr lang="en-US"/>
           </a:p>
@@ -2193,7 +2193,7 @@
               <a:pPr>
                 <a:defRPr/>
               </a:pPr>
-              <a:t>4/7/13</a:t>
+              <a:t>4/16/13</a:t>
             </a:fld>
             <a:endParaRPr lang="en-US"/>
           </a:p>
@@ -2492,7 +2492,7 @@
               <a:pPr>
                 <a:defRPr/>
               </a:pPr>
-              <a:t>4/7/13</a:t>
+              <a:t>4/16/13</a:t>
             </a:fld>
             <a:endParaRPr lang="en-US"/>
           </a:p>
@@ -2770,7 +2770,7 @@
               <a:pPr>
                 <a:defRPr/>
               </a:pPr>
-              <a:t>4/7/13</a:t>
+              <a:t>4/16/13</a:t>
             </a:fld>
             <a:endParaRPr lang="en-US"/>
           </a:p>
@@ -3026,7 +3026,7 @@
               <a:pPr>
                 <a:defRPr/>
               </a:pPr>
-              <a:t>4/7/13</a:t>
+              <a:t>4/16/13</a:t>
             </a:fld>
             <a:endParaRPr lang="en-US"/>
           </a:p>
@@ -3927,7 +3927,7 @@
               <a:rPr lang="en-US" sz="1400" i="1" dirty="0" smtClean="0">
                 <a:latin typeface="Calibri" pitchFamily="34" charset="0"/>
               </a:rPr>
-              <a:t>9.2</a:t>
+              <a:t>6.9</a:t>
             </a:r>
             <a:r>
               <a:rPr lang="en-US" sz="1400" i="1" dirty="0" smtClean="0">
@@ -4080,13 +4080,19 @@
               <a:rPr lang="en-US" i="1" dirty="0" smtClean="0">
                 <a:latin typeface="Calibri" pitchFamily="34" charset="0"/>
               </a:rPr>
-              <a:t>7.6</a:t>
+              <a:t>5.3</a:t>
             </a:r>
             <a:r>
               <a:rPr lang="en-US" i="1" dirty="0" smtClean="0">
                 <a:latin typeface="Calibri" pitchFamily="34" charset="0"/>
               </a:rPr>
-              <a:t>MB increased </a:t>
+              <a:t>MB </a:t>
+            </a:r>
+            <a:r>
+              <a:rPr lang="en-US" i="1" dirty="0" smtClean="0">
+                <a:latin typeface="Calibri" pitchFamily="34" charset="0"/>
+              </a:rPr>
+              <a:t>increased </a:t>
             </a:r>
             <a:r>
               <a:rPr lang="en-US" i="1" dirty="0">
@@ -4098,7 +4104,7 @@
               <a:rPr lang="en-US" i="1" dirty="0" smtClean="0">
                 <a:latin typeface="Calibri" pitchFamily="34" charset="0"/>
               </a:rPr>
-              <a:t>9.2</a:t>
+              <a:t>6.9</a:t>
             </a:r>
             <a:r>
               <a:rPr lang="en-US" i="1" dirty="0" smtClean="0">
@@ -4112,6 +4118,459 @@
           </a:p>
         </p:txBody>
       </p:sp>
+      <p:grpSp>
+        <p:nvGrpSpPr>
+          <p:cNvPr id="9" name="Group 8"/>
+          <p:cNvGrpSpPr/>
+          <p:nvPr/>
+        </p:nvGrpSpPr>
+        <p:grpSpPr>
+          <a:xfrm>
+            <a:off x="152400" y="1524000"/>
+            <a:ext cx="2590800" cy="2971800"/>
+            <a:chOff x="228600" y="1600200"/>
+            <a:chExt cx="2590800" cy="2971800"/>
+          </a:xfrm>
+        </p:grpSpPr>
+        <p:sp>
+          <p:nvSpPr>
+            <p:cNvPr id="15" name="Regular Pentagon 14"/>
+            <p:cNvSpPr/>
+            <p:nvPr/>
+          </p:nvSpPr>
+          <p:spPr>
+            <a:xfrm>
+              <a:off x="404812" y="2123235"/>
+              <a:ext cx="2262188" cy="854075"/>
+            </a:xfrm>
+            <a:prstGeom prst="pentagon">
+              <a:avLst/>
+            </a:prstGeom>
+            <a:noFill/>
+            <a:ln>
+              <a:solidFill>
+                <a:schemeClr val="tx1"/>
+              </a:solidFill>
+            </a:ln>
+          </p:spPr>
+          <p:style>
+            <a:lnRef idx="1">
+              <a:schemeClr val="accent1"/>
+            </a:lnRef>
+            <a:fillRef idx="3">
+              <a:schemeClr val="accent1"/>
+            </a:fillRef>
+            <a:effectRef idx="2">
+              <a:schemeClr val="accent1"/>
+            </a:effectRef>
+            <a:fontRef idx="minor">
+              <a:schemeClr val="lt1"/>
+            </a:fontRef>
+          </p:style>
+          <p:txBody>
+            <a:bodyPr anchor="ctr"/>
+            <a:lstStyle/>
+            <a:p>
+              <a:pPr algn="ctr" fontAlgn="auto">
+                <a:spcBef>
+                  <a:spcPts val="0"/>
+                </a:spcBef>
+                <a:spcAft>
+                  <a:spcPts val="0"/>
+                </a:spcAft>
+                <a:defRPr/>
+              </a:pPr>
+              <a:endParaRPr lang="en-US" sz="1400"/>
+            </a:p>
+          </p:txBody>
+        </p:sp>
+        <p:sp>
+          <p:nvSpPr>
+            <p:cNvPr id="16" name="Regular Pentagon 15"/>
+            <p:cNvSpPr/>
+            <p:nvPr/>
+          </p:nvSpPr>
+          <p:spPr>
+            <a:xfrm>
+              <a:off x="404812" y="3260725"/>
+              <a:ext cx="2262188" cy="854075"/>
+            </a:xfrm>
+            <a:prstGeom prst="pentagon">
+              <a:avLst/>
+            </a:prstGeom>
+            <a:noFill/>
+            <a:ln>
+              <a:solidFill>
+                <a:schemeClr val="tx1"/>
+              </a:solidFill>
+            </a:ln>
+          </p:spPr>
+          <p:style>
+            <a:lnRef idx="1">
+              <a:schemeClr val="accent1"/>
+            </a:lnRef>
+            <a:fillRef idx="3">
+              <a:schemeClr val="accent1"/>
+            </a:fillRef>
+            <a:effectRef idx="2">
+              <a:schemeClr val="accent1"/>
+            </a:effectRef>
+            <a:fontRef idx="minor">
+              <a:schemeClr val="lt1"/>
+            </a:fontRef>
+          </p:style>
+          <p:txBody>
+            <a:bodyPr anchor="ctr"/>
+            <a:lstStyle/>
+            <a:p>
+              <a:pPr algn="ctr" fontAlgn="auto">
+                <a:spcBef>
+                  <a:spcPts val="0"/>
+                </a:spcBef>
+                <a:spcAft>
+                  <a:spcPts val="0"/>
+                </a:spcAft>
+                <a:defRPr/>
+              </a:pPr>
+              <a:endParaRPr lang="en-US" sz="1400"/>
+            </a:p>
+          </p:txBody>
+        </p:sp>
+        <p:cxnSp>
+          <p:nvCxnSpPr>
+            <p:cNvPr id="17" name="Straight Arrow Connector 16"/>
+            <p:cNvCxnSpPr>
+              <a:stCxn id="15" idx="3"/>
+              <a:endCxn id="16" idx="0"/>
+            </p:cNvCxnSpPr>
+            <p:nvPr/>
+          </p:nvCxnSpPr>
+          <p:spPr>
+            <a:xfrm>
+              <a:off x="1535906" y="2977310"/>
+              <a:ext cx="0" cy="283415"/>
+            </a:xfrm>
+            <a:prstGeom prst="straightConnector1">
+              <a:avLst/>
+            </a:prstGeom>
+            <a:ln>
+              <a:solidFill>
+                <a:schemeClr val="tx1"/>
+              </a:solidFill>
+              <a:tailEnd type="arrow"/>
+            </a:ln>
+          </p:spPr>
+          <p:style>
+            <a:lnRef idx="2">
+              <a:schemeClr val="accent1"/>
+            </a:lnRef>
+            <a:fillRef idx="0">
+              <a:schemeClr val="accent1"/>
+            </a:fillRef>
+            <a:effectRef idx="1">
+              <a:schemeClr val="accent1"/>
+            </a:effectRef>
+            <a:fontRef idx="minor">
+              <a:schemeClr val="tx1"/>
+            </a:fontRef>
+          </p:style>
+        </p:cxnSp>
+        <p:sp>
+          <p:nvSpPr>
+            <p:cNvPr id="18" name="TextBox 35"/>
+            <p:cNvSpPr txBox="1">
+              <a:spLocks noChangeArrowheads="1"/>
+            </p:cNvSpPr>
+            <p:nvPr/>
+          </p:nvSpPr>
+          <p:spPr bwMode="auto">
+            <a:xfrm>
+              <a:off x="1491550" y="2863850"/>
+              <a:ext cx="274637" cy="304800"/>
+            </a:xfrm>
+            <a:prstGeom prst="rect">
+              <a:avLst/>
+            </a:prstGeom>
+            <a:noFill/>
+            <a:ln w="9525">
+              <a:noFill/>
+              <a:miter lim="800000"/>
+              <a:headEnd/>
+              <a:tailEnd/>
+            </a:ln>
+          </p:spPr>
+          <p:txBody>
+            <a:bodyPr wrap="none">
+              <a:spAutoFit/>
+            </a:bodyPr>
+            <a:lstStyle/>
+            <a:p>
+              <a:r>
+                <a:rPr lang="en-US" sz="1400" dirty="0">
+                  <a:latin typeface="Calibri" pitchFamily="34" charset="0"/>
+                </a:rPr>
+                <a:t>1</a:t>
+              </a:r>
+            </a:p>
+          </p:txBody>
+        </p:sp>
+        <p:sp>
+          <p:nvSpPr>
+            <p:cNvPr id="23" name="TextBox 32"/>
+            <p:cNvSpPr txBox="1">
+              <a:spLocks noChangeArrowheads="1"/>
+            </p:cNvSpPr>
+            <p:nvPr/>
+          </p:nvSpPr>
+          <p:spPr bwMode="auto">
+            <a:xfrm>
+              <a:off x="762954" y="2360688"/>
+              <a:ext cx="1545904" cy="523220"/>
+            </a:xfrm>
+            <a:prstGeom prst="rect">
+              <a:avLst/>
+            </a:prstGeom>
+            <a:noFill/>
+            <a:ln w="9525">
+              <a:noFill/>
+              <a:miter lim="800000"/>
+              <a:headEnd/>
+              <a:tailEnd/>
+            </a:ln>
+          </p:spPr>
+          <p:txBody>
+            <a:bodyPr wrap="none">
+              <a:spAutoFit/>
+            </a:bodyPr>
+            <a:lstStyle/>
+            <a:p>
+              <a:pPr algn="ctr"/>
+              <a:r>
+                <a:rPr lang="en-US" sz="1400" dirty="0" err="1" smtClean="0">
+                  <a:latin typeface="Calibri" pitchFamily="34" charset="0"/>
+                </a:rPr>
+                <a:t>UnmodifiableList</a:t>
+              </a:r>
+              <a:endParaRPr lang="en-US" sz="1400" dirty="0">
+                <a:latin typeface="Calibri" pitchFamily="34" charset="0"/>
+              </a:endParaRPr>
+            </a:p>
+            <a:p>
+              <a:pPr algn="ctr"/>
+              <a:r>
+                <a:rPr lang="en-US" sz="1400" i="1" dirty="0">
+                  <a:latin typeface="Calibri" pitchFamily="34" charset="0"/>
+                </a:rPr>
+                <a:t>x100,000 = </a:t>
+              </a:r>
+              <a:r>
+                <a:rPr lang="en-US" sz="1400" i="1" dirty="0" smtClean="0">
+                  <a:latin typeface="Calibri" pitchFamily="34" charset="0"/>
+                </a:rPr>
+                <a:t>1.5MB</a:t>
+              </a:r>
+              <a:endParaRPr lang="en-US" sz="1400" i="1" dirty="0">
+                <a:latin typeface="Calibri" pitchFamily="34" charset="0"/>
+              </a:endParaRPr>
+            </a:p>
+          </p:txBody>
+        </p:sp>
+        <p:sp>
+          <p:nvSpPr>
+            <p:cNvPr id="25" name="TextBox 32"/>
+            <p:cNvSpPr txBox="1">
+              <a:spLocks noChangeArrowheads="1"/>
+            </p:cNvSpPr>
+            <p:nvPr/>
+          </p:nvSpPr>
+          <p:spPr bwMode="auto">
+            <a:xfrm>
+              <a:off x="762954" y="3497739"/>
+              <a:ext cx="1545904" cy="523220"/>
+            </a:xfrm>
+            <a:prstGeom prst="rect">
+              <a:avLst/>
+            </a:prstGeom>
+            <a:noFill/>
+            <a:ln w="9525">
+              <a:noFill/>
+              <a:miter lim="800000"/>
+              <a:headEnd/>
+              <a:tailEnd/>
+            </a:ln>
+          </p:spPr>
+          <p:txBody>
+            <a:bodyPr wrap="none">
+              <a:spAutoFit/>
+            </a:bodyPr>
+            <a:lstStyle/>
+            <a:p>
+              <a:pPr algn="ctr"/>
+              <a:r>
+                <a:rPr lang="en-US" sz="1400" dirty="0" err="1" smtClean="0">
+                  <a:latin typeface="Calibri" pitchFamily="34" charset="0"/>
+                </a:rPr>
+                <a:t>Array</a:t>
+              </a:r>
+              <a:r>
+                <a:rPr lang="en-US" sz="1400" dirty="0" err="1" smtClean="0">
+                  <a:latin typeface="Calibri" pitchFamily="34" charset="0"/>
+                </a:rPr>
+                <a:t>List</a:t>
+              </a:r>
+              <a:endParaRPr lang="en-US" sz="1400" dirty="0">
+                <a:latin typeface="Calibri" pitchFamily="34" charset="0"/>
+              </a:endParaRPr>
+            </a:p>
+            <a:p>
+              <a:pPr algn="ctr"/>
+              <a:r>
+                <a:rPr lang="en-US" sz="1400" i="1" dirty="0">
+                  <a:latin typeface="Calibri" pitchFamily="34" charset="0"/>
+                </a:rPr>
+                <a:t>x100,000 = </a:t>
+              </a:r>
+              <a:r>
+                <a:rPr lang="en-US" sz="1400" i="1" dirty="0" smtClean="0">
+                  <a:latin typeface="Calibri" pitchFamily="34" charset="0"/>
+                </a:rPr>
+                <a:t>5.3</a:t>
+              </a:r>
+              <a:r>
+                <a:rPr lang="en-US" sz="1400" i="1" dirty="0" smtClean="0">
+                  <a:latin typeface="Calibri" pitchFamily="34" charset="0"/>
+                </a:rPr>
+                <a:t>MB</a:t>
+              </a:r>
+              <a:endParaRPr lang="en-US" sz="1400" i="1" dirty="0">
+                <a:latin typeface="Calibri" pitchFamily="34" charset="0"/>
+              </a:endParaRPr>
+            </a:p>
+          </p:txBody>
+        </p:sp>
+        <p:sp>
+          <p:nvSpPr>
+            <p:cNvPr id="6" name="Oval 5"/>
+            <p:cNvSpPr/>
+            <p:nvPr/>
+          </p:nvSpPr>
+          <p:spPr>
+            <a:xfrm>
+              <a:off x="228600" y="1600200"/>
+              <a:ext cx="2590800" cy="2971800"/>
+            </a:xfrm>
+            <a:prstGeom prst="ellipse">
+              <a:avLst/>
+            </a:prstGeom>
+            <a:noFill/>
+            <a:ln>
+              <a:solidFill>
+                <a:schemeClr val="tx1"/>
+              </a:solidFill>
+            </a:ln>
+          </p:spPr>
+          <p:style>
+            <a:lnRef idx="1">
+              <a:schemeClr val="accent1"/>
+            </a:lnRef>
+            <a:fillRef idx="3">
+              <a:schemeClr val="accent1"/>
+            </a:fillRef>
+            <a:effectRef idx="2">
+              <a:schemeClr val="accent1"/>
+            </a:effectRef>
+            <a:fontRef idx="minor">
+              <a:schemeClr val="lt1"/>
+            </a:fontRef>
+          </p:style>
+          <p:txBody>
+            <a:bodyPr rtlCol="0" anchor="ctr"/>
+            <a:lstStyle/>
+            <a:p>
+              <a:pPr algn="ctr"/>
+              <a:endParaRPr lang="en-US"/>
+            </a:p>
+          </p:txBody>
+        </p:sp>
+      </p:grpSp>
+      <p:cxnSp>
+        <p:nvCxnSpPr>
+          <p:cNvPr id="11" name="Straight Connector 10"/>
+          <p:cNvCxnSpPr>
+            <a:stCxn id="6" idx="7"/>
+            <a:endCxn id="7" idx="0"/>
+          </p:cNvCxnSpPr>
+          <p:nvPr/>
+        </p:nvCxnSpPr>
+        <p:spPr>
+          <a:xfrm>
+            <a:off x="2363786" y="1959210"/>
+            <a:ext cx="2091533" cy="630003"/>
+          </a:xfrm>
+          <a:prstGeom prst="line">
+            <a:avLst/>
+          </a:prstGeom>
+          <a:ln>
+            <a:solidFill>
+              <a:schemeClr val="tx1"/>
+            </a:solidFill>
+            <a:prstDash val="dash"/>
+          </a:ln>
+        </p:spPr>
+        <p:style>
+          <a:lnRef idx="2">
+            <a:schemeClr val="accent1"/>
+          </a:lnRef>
+          <a:fillRef idx="0">
+            <a:schemeClr val="accent1"/>
+          </a:fillRef>
+          <a:effectRef idx="1">
+            <a:schemeClr val="accent1"/>
+          </a:effectRef>
+          <a:fontRef idx="minor">
+            <a:schemeClr val="tx1"/>
+          </a:fontRef>
+        </p:style>
+      </p:cxnSp>
+      <p:cxnSp>
+        <p:nvCxnSpPr>
+          <p:cNvPr id="33" name="Straight Connector 32"/>
+          <p:cNvCxnSpPr>
+            <a:stCxn id="6" idx="5"/>
+            <a:endCxn id="7" idx="3"/>
+          </p:cNvCxnSpPr>
+          <p:nvPr/>
+        </p:nvCxnSpPr>
+        <p:spPr>
+          <a:xfrm flipV="1">
+            <a:off x="2363786" y="3443288"/>
+            <a:ext cx="2091533" cy="617302"/>
+          </a:xfrm>
+          <a:prstGeom prst="line">
+            <a:avLst/>
+          </a:prstGeom>
+          <a:ln>
+            <a:solidFill>
+              <a:schemeClr val="tx1"/>
+            </a:solidFill>
+            <a:prstDash val="dash"/>
+          </a:ln>
+        </p:spPr>
+        <p:style>
+          <a:lnRef idx="2">
+            <a:schemeClr val="accent1"/>
+          </a:lnRef>
+          <a:fillRef idx="0">
+            <a:schemeClr val="accent1"/>
+          </a:fillRef>
+          <a:effectRef idx="1">
+            <a:schemeClr val="accent1"/>
+          </a:effectRef>
+          <a:fontRef idx="minor">
+            <a:schemeClr val="tx1"/>
+          </a:fontRef>
+        </p:style>
+      </p:cxnSp>
     </p:spTree>
   </p:cSld>
   <p:clrMapOvr>

</xml_diff>

<commit_message>
Special-purpose collections: Unmodifiable: - text - updated figure
</commit_message>
<xml_diff>
--- a/part1/Figures/collections/product-unmodifiable-arraylist.pptx
+++ b/part1/Figures/collections/product-unmodifiable-arraylist.pptx
@@ -328,9 +328,9 @@
               <a:pPr>
                 <a:defRPr/>
               </a:pPr>
-              <a:t>4/16/13</a:t>
+              <a:t>4/18/13</a:t>
             </a:fld>
-            <a:endParaRPr lang="en-US"/>
+            <a:endParaRPr lang="en-US" dirty="0"/>
           </a:p>
         </p:txBody>
       </p:sp>
@@ -356,7 +356,7 @@
             <a:pPr>
               <a:defRPr/>
             </a:pPr>
-            <a:endParaRPr lang="en-US"/>
+            <a:endParaRPr lang="en-US" dirty="0"/>
           </a:p>
         </p:txBody>
       </p:sp>
@@ -389,7 +389,7 @@
               </a:pPr>
               <a:t>‹#›</a:t>
             </a:fld>
-            <a:endParaRPr lang="en-US"/>
+            <a:endParaRPr lang="en-US" dirty="0"/>
           </a:p>
         </p:txBody>
       </p:sp>
@@ -520,9 +520,9 @@
               <a:pPr>
                 <a:defRPr/>
               </a:pPr>
-              <a:t>4/16/13</a:t>
+              <a:t>4/18/13</a:t>
             </a:fld>
-            <a:endParaRPr lang="en-US"/>
+            <a:endParaRPr lang="en-US" dirty="0"/>
           </a:p>
         </p:txBody>
       </p:sp>
@@ -548,7 +548,7 @@
             <a:pPr>
               <a:defRPr/>
             </a:pPr>
-            <a:endParaRPr lang="en-US"/>
+            <a:endParaRPr lang="en-US" dirty="0"/>
           </a:p>
         </p:txBody>
       </p:sp>
@@ -581,7 +581,7 @@
               </a:pPr>
               <a:t>‹#›</a:t>
             </a:fld>
-            <a:endParaRPr lang="en-US"/>
+            <a:endParaRPr lang="en-US" dirty="0"/>
           </a:p>
         </p:txBody>
       </p:sp>
@@ -722,9 +722,9 @@
               <a:pPr>
                 <a:defRPr/>
               </a:pPr>
-              <a:t>4/16/13</a:t>
+              <a:t>4/18/13</a:t>
             </a:fld>
-            <a:endParaRPr lang="en-US"/>
+            <a:endParaRPr lang="en-US" dirty="0"/>
           </a:p>
         </p:txBody>
       </p:sp>
@@ -750,7 +750,7 @@
             <a:pPr>
               <a:defRPr/>
             </a:pPr>
-            <a:endParaRPr lang="en-US"/>
+            <a:endParaRPr lang="en-US" dirty="0"/>
           </a:p>
         </p:txBody>
       </p:sp>
@@ -783,7 +783,7 @@
               </a:pPr>
               <a:t>‹#›</a:t>
             </a:fld>
-            <a:endParaRPr lang="en-US"/>
+            <a:endParaRPr lang="en-US" dirty="0"/>
           </a:p>
         </p:txBody>
       </p:sp>
@@ -914,9 +914,9 @@
               <a:pPr>
                 <a:defRPr/>
               </a:pPr>
-              <a:t>4/16/13</a:t>
+              <a:t>4/18/13</a:t>
             </a:fld>
-            <a:endParaRPr lang="en-US"/>
+            <a:endParaRPr lang="en-US" dirty="0"/>
           </a:p>
         </p:txBody>
       </p:sp>
@@ -942,7 +942,7 @@
             <a:pPr>
               <a:defRPr/>
             </a:pPr>
-            <a:endParaRPr lang="en-US"/>
+            <a:endParaRPr lang="en-US" dirty="0"/>
           </a:p>
         </p:txBody>
       </p:sp>
@@ -975,7 +975,7 @@
               </a:pPr>
               <a:t>‹#›</a:t>
             </a:fld>
-            <a:endParaRPr lang="en-US"/>
+            <a:endParaRPr lang="en-US" dirty="0"/>
           </a:p>
         </p:txBody>
       </p:sp>
@@ -1182,9 +1182,9 @@
               <a:pPr>
                 <a:defRPr/>
               </a:pPr>
-              <a:t>4/16/13</a:t>
+              <a:t>4/18/13</a:t>
             </a:fld>
-            <a:endParaRPr lang="en-US"/>
+            <a:endParaRPr lang="en-US" dirty="0"/>
           </a:p>
         </p:txBody>
       </p:sp>
@@ -1210,7 +1210,7 @@
             <a:pPr>
               <a:defRPr/>
             </a:pPr>
-            <a:endParaRPr lang="en-US"/>
+            <a:endParaRPr lang="en-US" dirty="0"/>
           </a:p>
         </p:txBody>
       </p:sp>
@@ -1243,7 +1243,7 @@
               </a:pPr>
               <a:t>‹#›</a:t>
             </a:fld>
-            <a:endParaRPr lang="en-US"/>
+            <a:endParaRPr lang="en-US" dirty="0"/>
           </a:p>
         </p:txBody>
       </p:sp>
@@ -1492,9 +1492,9 @@
               <a:pPr>
                 <a:defRPr/>
               </a:pPr>
-              <a:t>4/16/13</a:t>
+              <a:t>4/18/13</a:t>
             </a:fld>
-            <a:endParaRPr lang="en-US"/>
+            <a:endParaRPr lang="en-US" dirty="0"/>
           </a:p>
         </p:txBody>
       </p:sp>
@@ -1520,7 +1520,7 @@
             <a:pPr>
               <a:defRPr/>
             </a:pPr>
-            <a:endParaRPr lang="en-US"/>
+            <a:endParaRPr lang="en-US" dirty="0"/>
           </a:p>
         </p:txBody>
       </p:sp>
@@ -1553,7 +1553,7 @@
               </a:pPr>
               <a:t>‹#›</a:t>
             </a:fld>
-            <a:endParaRPr lang="en-US"/>
+            <a:endParaRPr lang="en-US" dirty="0"/>
           </a:p>
         </p:txBody>
       </p:sp>
@@ -1936,9 +1936,9 @@
               <a:pPr>
                 <a:defRPr/>
               </a:pPr>
-              <a:t>4/16/13</a:t>
+              <a:t>4/18/13</a:t>
             </a:fld>
-            <a:endParaRPr lang="en-US"/>
+            <a:endParaRPr lang="en-US" dirty="0"/>
           </a:p>
         </p:txBody>
       </p:sp>
@@ -1964,7 +1964,7 @@
             <a:pPr>
               <a:defRPr/>
             </a:pPr>
-            <a:endParaRPr lang="en-US"/>
+            <a:endParaRPr lang="en-US" dirty="0"/>
           </a:p>
         </p:txBody>
       </p:sp>
@@ -1997,7 +1997,7 @@
               </a:pPr>
               <a:t>‹#›</a:t>
             </a:fld>
-            <a:endParaRPr lang="en-US"/>
+            <a:endParaRPr lang="en-US" dirty="0"/>
           </a:p>
         </p:txBody>
       </p:sp>
@@ -2076,9 +2076,9 @@
               <a:pPr>
                 <a:defRPr/>
               </a:pPr>
-              <a:t>4/16/13</a:t>
+              <a:t>4/18/13</a:t>
             </a:fld>
-            <a:endParaRPr lang="en-US"/>
+            <a:endParaRPr lang="en-US" dirty="0"/>
           </a:p>
         </p:txBody>
       </p:sp>
@@ -2104,7 +2104,7 @@
             <a:pPr>
               <a:defRPr/>
             </a:pPr>
-            <a:endParaRPr lang="en-US"/>
+            <a:endParaRPr lang="en-US" dirty="0"/>
           </a:p>
         </p:txBody>
       </p:sp>
@@ -2137,7 +2137,7 @@
               </a:pPr>
               <a:t>‹#›</a:t>
             </a:fld>
-            <a:endParaRPr lang="en-US"/>
+            <a:endParaRPr lang="en-US" dirty="0"/>
           </a:p>
         </p:txBody>
       </p:sp>
@@ -2193,9 +2193,9 @@
               <a:pPr>
                 <a:defRPr/>
               </a:pPr>
-              <a:t>4/16/13</a:t>
+              <a:t>4/18/13</a:t>
             </a:fld>
-            <a:endParaRPr lang="en-US"/>
+            <a:endParaRPr lang="en-US" dirty="0"/>
           </a:p>
         </p:txBody>
       </p:sp>
@@ -2221,7 +2221,7 @@
             <a:pPr>
               <a:defRPr/>
             </a:pPr>
-            <a:endParaRPr lang="en-US"/>
+            <a:endParaRPr lang="en-US" dirty="0"/>
           </a:p>
         </p:txBody>
       </p:sp>
@@ -2254,7 +2254,7 @@
               </a:pPr>
               <a:t>‹#›</a:t>
             </a:fld>
-            <a:endParaRPr lang="en-US"/>
+            <a:endParaRPr lang="en-US" dirty="0"/>
           </a:p>
         </p:txBody>
       </p:sp>
@@ -2492,9 +2492,9 @@
               <a:pPr>
                 <a:defRPr/>
               </a:pPr>
-              <a:t>4/16/13</a:t>
+              <a:t>4/18/13</a:t>
             </a:fld>
-            <a:endParaRPr lang="en-US"/>
+            <a:endParaRPr lang="en-US" dirty="0"/>
           </a:p>
         </p:txBody>
       </p:sp>
@@ -2520,7 +2520,7 @@
             <a:pPr>
               <a:defRPr/>
             </a:pPr>
-            <a:endParaRPr lang="en-US"/>
+            <a:endParaRPr lang="en-US" dirty="0"/>
           </a:p>
         </p:txBody>
       </p:sp>
@@ -2553,7 +2553,7 @@
               </a:pPr>
               <a:t>‹#›</a:t>
             </a:fld>
-            <a:endParaRPr lang="en-US"/>
+            <a:endParaRPr lang="en-US" dirty="0"/>
           </a:p>
         </p:txBody>
       </p:sp>
@@ -2674,7 +2674,7 @@
           </a:lstStyle>
           <a:p>
             <a:pPr lvl="0"/>
-            <a:endParaRPr lang="en-US" noProof="0"/>
+            <a:endParaRPr lang="en-US" noProof="0" dirty="0"/>
           </a:p>
         </p:txBody>
       </p:sp>
@@ -2770,9 +2770,9 @@
               <a:pPr>
                 <a:defRPr/>
               </a:pPr>
-              <a:t>4/16/13</a:t>
+              <a:t>4/18/13</a:t>
             </a:fld>
-            <a:endParaRPr lang="en-US"/>
+            <a:endParaRPr lang="en-US" dirty="0"/>
           </a:p>
         </p:txBody>
       </p:sp>
@@ -2798,7 +2798,7 @@
             <a:pPr>
               <a:defRPr/>
             </a:pPr>
-            <a:endParaRPr lang="en-US"/>
+            <a:endParaRPr lang="en-US" dirty="0"/>
           </a:p>
         </p:txBody>
       </p:sp>
@@ -2831,7 +2831,7 @@
               </a:pPr>
               <a:t>‹#›</a:t>
             </a:fld>
-            <a:endParaRPr lang="en-US"/>
+            <a:endParaRPr lang="en-US" dirty="0"/>
           </a:p>
         </p:txBody>
       </p:sp>
@@ -3026,9 +3026,9 @@
               <a:pPr>
                 <a:defRPr/>
               </a:pPr>
-              <a:t>4/16/13</a:t>
+              <a:t>4/18/13</a:t>
             </a:fld>
-            <a:endParaRPr lang="en-US"/>
+            <a:endParaRPr lang="en-US" dirty="0"/>
           </a:p>
         </p:txBody>
       </p:sp>
@@ -3076,7 +3076,7 @@
             <a:pPr>
               <a:defRPr/>
             </a:pPr>
-            <a:endParaRPr lang="en-US"/>
+            <a:endParaRPr lang="en-US" dirty="0"/>
           </a:p>
         </p:txBody>
       </p:sp>
@@ -3131,7 +3131,7 @@
               </a:pPr>
               <a:t>‹#›</a:t>
             </a:fld>
-            <a:endParaRPr lang="en-US"/>
+            <a:endParaRPr lang="en-US" dirty="0"/>
           </a:p>
         </p:txBody>
       </p:sp>
@@ -3598,7 +3598,7 @@
               </a:spcAft>
               <a:defRPr/>
             </a:pPr>
-            <a:endParaRPr lang="en-US" sz="1400"/>
+            <a:endParaRPr lang="en-US" sz="1400" dirty="0"/>
           </a:p>
         </p:txBody>
       </p:sp>
@@ -3650,7 +3650,7 @@
               </a:spcAft>
               <a:defRPr/>
             </a:pPr>
-            <a:endParaRPr lang="en-US" sz="1400"/>
+            <a:endParaRPr lang="en-US" sz="1400" dirty="0"/>
           </a:p>
         </p:txBody>
       </p:sp>
@@ -3762,7 +3762,7 @@
           <a:lstStyle/>
           <a:p>
             <a:r>
-              <a:rPr lang="en-US" sz="1400">
+              <a:rPr lang="en-US" sz="1400" dirty="0">
                 <a:latin typeface="Calibri" pitchFamily="34" charset="0"/>
               </a:rPr>
               <a:t>         Supplier</a:t>
@@ -3770,7 +3770,7 @@
           </a:p>
           <a:p>
             <a:r>
-              <a:rPr lang="en-US" sz="1400" i="1">
+              <a:rPr lang="en-US" sz="1400" i="1" dirty="0">
                 <a:latin typeface="Calibri" pitchFamily="34" charset="0"/>
               </a:rPr>
               <a:t>        x400,000 </a:t>
@@ -3809,7 +3809,7 @@
           <a:lstStyle/>
           <a:p>
             <a:r>
-              <a:rPr lang="en-US" sz="1400">
+              <a:rPr lang="en-US" sz="1400" dirty="0">
                 <a:latin typeface="Calibri" pitchFamily="34" charset="0"/>
               </a:rPr>
               <a:t>1</a:t>
@@ -3848,7 +3848,7 @@
           <a:lstStyle/>
           <a:p>
             <a:r>
-              <a:rPr lang="en-US" sz="1400">
+              <a:rPr lang="en-US" sz="1400" dirty="0">
                 <a:latin typeface="Calibri" pitchFamily="34" charset="0"/>
               </a:rPr>
               <a:t>4</a:t>
@@ -3888,14 +3888,11 @@
           <a:p>
             <a:pPr algn="ctr"/>
             <a:r>
-              <a:rPr lang="en-US" sz="1400" dirty="0" err="1" smtClean="0">
+              <a:rPr lang="en-US" sz="1400" dirty="0" smtClean="0">
                 <a:latin typeface="Calibri" pitchFamily="34" charset="0"/>
               </a:rPr>
               <a:t>Unmodifiable</a:t>
             </a:r>
-            <a:endParaRPr lang="en-US" sz="1400" dirty="0" smtClean="0">
-              <a:latin typeface="Calibri" pitchFamily="34" charset="0"/>
-            </a:endParaRPr>
           </a:p>
           <a:p>
             <a:pPr algn="ctr"/>
@@ -3903,13 +3900,7 @@
               <a:rPr lang="en-US" sz="1400" dirty="0" smtClean="0">
                 <a:latin typeface="Calibri" pitchFamily="34" charset="0"/>
               </a:rPr>
-              <a:t> </a:t>
-            </a:r>
-            <a:r>
-              <a:rPr lang="en-US" sz="1400" dirty="0" err="1" smtClean="0">
-                <a:latin typeface="Calibri" pitchFamily="34" charset="0"/>
-              </a:rPr>
-              <a:t>ArrayList</a:t>
+              <a:t> ArrayList</a:t>
             </a:r>
             <a:endParaRPr lang="en-US" sz="1400" dirty="0">
               <a:latin typeface="Calibri" pitchFamily="34" charset="0"/>
@@ -3927,13 +3918,7 @@
               <a:rPr lang="en-US" sz="1400" i="1" dirty="0" smtClean="0">
                 <a:latin typeface="Calibri" pitchFamily="34" charset="0"/>
               </a:rPr>
-              <a:t>6.9</a:t>
-            </a:r>
-            <a:r>
-              <a:rPr lang="en-US" sz="1400" i="1" dirty="0" smtClean="0">
-                <a:latin typeface="Calibri" pitchFamily="34" charset="0"/>
-              </a:rPr>
-              <a:t>MB</a:t>
+              <a:t>6.9MB</a:t>
             </a:r>
             <a:endParaRPr lang="en-US" sz="1400" i="1" dirty="0">
               <a:latin typeface="Calibri" pitchFamily="34" charset="0"/>
@@ -4042,7 +4027,7 @@
               </a:spcAft>
               <a:defRPr/>
             </a:pPr>
-            <a:endParaRPr lang="en-US" sz="1400"/>
+            <a:endParaRPr lang="en-US" sz="1400" dirty="0"/>
           </a:p>
         </p:txBody>
       </p:sp>
@@ -4080,19 +4065,7 @@
               <a:rPr lang="en-US" i="1" dirty="0" smtClean="0">
                 <a:latin typeface="Calibri" pitchFamily="34" charset="0"/>
               </a:rPr>
-              <a:t>5.3</a:t>
-            </a:r>
-            <a:r>
-              <a:rPr lang="en-US" i="1" dirty="0" smtClean="0">
-                <a:latin typeface="Calibri" pitchFamily="34" charset="0"/>
-              </a:rPr>
-              <a:t>MB </a:t>
-            </a:r>
-            <a:r>
-              <a:rPr lang="en-US" i="1" dirty="0" smtClean="0">
-                <a:latin typeface="Calibri" pitchFamily="34" charset="0"/>
-              </a:rPr>
-              <a:t>increased </a:t>
+              <a:t>5.3MB increased </a:t>
             </a:r>
             <a:r>
               <a:rPr lang="en-US" i="1" dirty="0">
@@ -4104,13 +4077,7 @@
               <a:rPr lang="en-US" i="1" dirty="0" smtClean="0">
                 <a:latin typeface="Calibri" pitchFamily="34" charset="0"/>
               </a:rPr>
-              <a:t>6.9</a:t>
-            </a:r>
-            <a:r>
-              <a:rPr lang="en-US" i="1" dirty="0" smtClean="0">
-                <a:latin typeface="Calibri" pitchFamily="34" charset="0"/>
-              </a:rPr>
-              <a:t>MB</a:t>
+              <a:t>6.9MB</a:t>
             </a:r>
             <a:endParaRPr lang="en-US" dirty="0">
               <a:latin typeface="Calibri" pitchFamily="34" charset="0"/>
@@ -4131,6 +4098,11 @@
             <a:chOff x="228600" y="1600200"/>
             <a:chExt cx="2590800" cy="2971800"/>
           </a:xfrm>
+          <a:solidFill>
+            <a:schemeClr val="bg2">
+              <a:alpha val="25000"/>
+            </a:schemeClr>
+          </a:solidFill>
         </p:grpSpPr>
         <p:sp>
           <p:nvSpPr>
@@ -4146,7 +4118,7 @@
             <a:prstGeom prst="pentagon">
               <a:avLst/>
             </a:prstGeom>
-            <a:noFill/>
+            <a:grpFill/>
             <a:ln>
               <a:solidFill>
                 <a:schemeClr val="tx1"/>
@@ -4180,7 +4152,7 @@
                 </a:spcAft>
                 <a:defRPr/>
               </a:pPr>
-              <a:endParaRPr lang="en-US" sz="1400"/>
+              <a:endParaRPr lang="en-US" sz="1400" dirty="0"/>
             </a:p>
           </p:txBody>
         </p:sp>
@@ -4198,7 +4170,7 @@
             <a:prstGeom prst="pentagon">
               <a:avLst/>
             </a:prstGeom>
-            <a:noFill/>
+            <a:grpFill/>
             <a:ln>
               <a:solidFill>
                 <a:schemeClr val="tx1"/>
@@ -4232,7 +4204,7 @@
                 </a:spcAft>
                 <a:defRPr/>
               </a:pPr>
-              <a:endParaRPr lang="en-US" sz="1400"/>
+              <a:endParaRPr lang="en-US" sz="1400" dirty="0"/>
             </a:p>
           </p:txBody>
         </p:sp>
@@ -4253,6 +4225,7 @@
             <a:prstGeom prst="straightConnector1">
               <a:avLst/>
             </a:prstGeom>
+            <a:grpFill/>
             <a:ln>
               <a:solidFill>
                 <a:schemeClr val="tx1"/>
@@ -4291,7 +4264,7 @@
             <a:prstGeom prst="rect">
               <a:avLst/>
             </a:prstGeom>
-            <a:noFill/>
+            <a:grpFill/>
             <a:ln w="9525">
               <a:noFill/>
               <a:miter lim="800000"/>
@@ -4330,7 +4303,7 @@
             <a:prstGeom prst="rect">
               <a:avLst/>
             </a:prstGeom>
-            <a:noFill/>
+            <a:grpFill/>
             <a:ln w="9525">
               <a:noFill/>
               <a:miter lim="800000"/>
@@ -4346,7 +4319,7 @@
             <a:p>
               <a:pPr algn="ctr"/>
               <a:r>
-                <a:rPr lang="en-US" sz="1400" dirty="0" err="1" smtClean="0">
+                <a:rPr lang="en-US" sz="1400" dirty="0" smtClean="0">
                   <a:latin typeface="Calibri" pitchFamily="34" charset="0"/>
                 </a:rPr>
                 <a:t>UnmodifiableList</a:t>
@@ -4391,7 +4364,7 @@
             <a:prstGeom prst="rect">
               <a:avLst/>
             </a:prstGeom>
-            <a:noFill/>
+            <a:grpFill/>
             <a:ln w="9525">
               <a:noFill/>
               <a:miter lim="800000"/>
@@ -4407,16 +4380,10 @@
             <a:p>
               <a:pPr algn="ctr"/>
               <a:r>
-                <a:rPr lang="en-US" sz="1400" dirty="0" err="1" smtClean="0">
+                <a:rPr lang="en-US" sz="1400" dirty="0" smtClean="0">
                   <a:latin typeface="Calibri" pitchFamily="34" charset="0"/>
                 </a:rPr>
-                <a:t>Array</a:t>
-              </a:r>
-              <a:r>
-                <a:rPr lang="en-US" sz="1400" dirty="0" err="1" smtClean="0">
-                  <a:latin typeface="Calibri" pitchFamily="34" charset="0"/>
-                </a:rPr>
-                <a:t>List</a:t>
+                <a:t>ArrayList</a:t>
               </a:r>
               <a:endParaRPr lang="en-US" sz="1400" dirty="0">
                 <a:latin typeface="Calibri" pitchFamily="34" charset="0"/>
@@ -4434,13 +4401,7 @@
                 <a:rPr lang="en-US" sz="1400" i="1" dirty="0" smtClean="0">
                   <a:latin typeface="Calibri" pitchFamily="34" charset="0"/>
                 </a:rPr>
-                <a:t>5.3</a:t>
-              </a:r>
-              <a:r>
-                <a:rPr lang="en-US" sz="1400" i="1" dirty="0" smtClean="0">
-                  <a:latin typeface="Calibri" pitchFamily="34" charset="0"/>
-                </a:rPr>
-                <a:t>MB</a:t>
+                <a:t>5.3MB</a:t>
               </a:r>
               <a:endParaRPr lang="en-US" sz="1400" i="1" dirty="0">
                 <a:latin typeface="Calibri" pitchFamily="34" charset="0"/>
@@ -4462,7 +4423,7 @@
             <a:prstGeom prst="ellipse">
               <a:avLst/>
             </a:prstGeom>
-            <a:noFill/>
+            <a:grpFill/>
             <a:ln>
               <a:solidFill>
                 <a:schemeClr val="tx1"/>
@@ -4488,7 +4449,7 @@
             <a:lstStyle/>
             <a:p>
               <a:pPr algn="ctr"/>
-              <a:endParaRPr lang="en-US"/>
+              <a:endParaRPr lang="en-US" dirty="0"/>
             </a:p>
           </p:txBody>
         </p:sp>
@@ -4510,11 +4471,11 @@
           <a:prstGeom prst="line">
             <a:avLst/>
           </a:prstGeom>
-          <a:ln>
+          <a:ln w="6350" cmpd="sng">
             <a:solidFill>
               <a:schemeClr val="tx1"/>
             </a:solidFill>
-            <a:prstDash val="dash"/>
+            <a:prstDash val="sysDot"/>
           </a:ln>
         </p:spPr>
         <p:style>
@@ -4549,11 +4510,11 @@
           <a:prstGeom prst="line">
             <a:avLst/>
           </a:prstGeom>
-          <a:ln>
+          <a:ln w="6350" cmpd="sng">
             <a:solidFill>
               <a:schemeClr val="tx1"/>
             </a:solidFill>
-            <a:prstDash val="dash"/>
+            <a:prstDash val="sysDot"/>
           </a:ln>
         </p:spPr>
         <p:style>

</xml_diff>